<commit_message>
presentation and demos modified
</commit_message>
<xml_diff>
--- a/ASP_ExtensionPoints/Presentation/WebAPI.pptx
+++ b/ASP_ExtensionPoints/Presentation/WebAPI.pptx
@@ -220,7 +220,7 @@
           <a:p>
             <a:fld id="{C32DDFF6-00E2-4044-B5FA-FDADC32BD187}" type="datetimeFigureOut">
               <a:rPr lang="en-US" smtClean="0"/>
-              <a:t>6/12/2017</a:t>
+              <a:t>12-Aug-17</a:t>
             </a:fld>
             <a:endParaRPr lang="en-US"/>
           </a:p>
@@ -617,11 +617,168 @@
           <a:p>
             <a:r>
               <a:rPr lang="en-US" dirty="0"/>
-              <a:t>3. So no</a:t>
+              <a:t>1.</a:t>
             </a:r>
             <a:r>
               <a:rPr lang="en-US" baseline="0" dirty="0"/>
-              <a:t> exception can propagate to the lower levels.</a:t>
+              <a:t> Show the </a:t>
+            </a:r>
+            <a:r>
+              <a:rPr lang="en-US" sz="1200" kern="1200" dirty="0" err="1">
+                <a:solidFill>
+                  <a:schemeClr val="tx1"/>
+                </a:solidFill>
+                <a:effectLst/>
+                <a:latin typeface="+mn-lt"/>
+                <a:ea typeface="+mn-ea"/>
+                <a:cs typeface="+mn-cs"/>
+              </a:rPr>
+              <a:t>ApiControllerActionInvoker</a:t>
+            </a:r>
+            <a:r>
+              <a:rPr lang="en-US" sz="1200" kern="1200" dirty="0">
+                <a:solidFill>
+                  <a:schemeClr val="tx1"/>
+                </a:solidFill>
+                <a:effectLst/>
+                <a:latin typeface="+mn-lt"/>
+                <a:ea typeface="+mn-ea"/>
+                <a:cs typeface="+mn-cs"/>
+              </a:rPr>
+              <a:t>.</a:t>
+            </a:r>
+            <a:r>
+              <a:rPr lang="en-US" sz="1200" kern="1200" dirty="0">
+                <a:solidFill>
+                  <a:schemeClr val="tx1"/>
+                </a:solidFill>
+                <a:latin typeface="+mn-lt"/>
+                <a:ea typeface="+mn-ea"/>
+                <a:cs typeface="+mn-cs"/>
+              </a:rPr>
+              <a:t> </a:t>
+            </a:r>
+            <a:r>
+              <a:rPr lang="en-US" sz="1200" kern="1200" dirty="0" err="1">
+                <a:solidFill>
+                  <a:schemeClr val="tx1"/>
+                </a:solidFill>
+                <a:latin typeface="+mn-lt"/>
+                <a:ea typeface="+mn-ea"/>
+                <a:cs typeface="+mn-cs"/>
+              </a:rPr>
+              <a:t>InvokeActionAsync</a:t>
+            </a:r>
+            <a:r>
+              <a:rPr lang="en-US" sz="1200" kern="1200" dirty="0">
+                <a:solidFill>
+                  <a:schemeClr val="tx1"/>
+                </a:solidFill>
+                <a:latin typeface="+mn-lt"/>
+                <a:ea typeface="+mn-ea"/>
+                <a:cs typeface="+mn-cs"/>
+              </a:rPr>
+              <a:t> method</a:t>
+            </a:r>
+            <a:r>
+              <a:rPr lang="en-US" sz="1200" kern="1200" baseline="0" dirty="0">
+                <a:solidFill>
+                  <a:schemeClr val="tx1"/>
+                </a:solidFill>
+                <a:latin typeface="+mn-lt"/>
+                <a:ea typeface="+mn-ea"/>
+                <a:cs typeface="+mn-cs"/>
+              </a:rPr>
+              <a:t> inside the source code.</a:t>
+            </a:r>
+            <a:endParaRPr lang="en-US" dirty="0"/>
+          </a:p>
+          <a:p>
+            <a:r>
+              <a:rPr lang="en-US" dirty="0"/>
+              <a:t>Show</a:t>
+            </a:r>
+            <a:r>
+              <a:rPr lang="en-US" baseline="0" dirty="0"/>
+              <a:t> the try catch; Show how </a:t>
+            </a:r>
+            <a:r>
+              <a:rPr lang="en-US" sz="1200" kern="1200" dirty="0" err="1">
+                <a:solidFill>
+                  <a:schemeClr val="tx1"/>
+                </a:solidFill>
+                <a:effectLst/>
+                <a:latin typeface="+mn-lt"/>
+                <a:ea typeface="+mn-ea"/>
+                <a:cs typeface="+mn-cs"/>
+              </a:rPr>
+              <a:t>HttpResponseException</a:t>
+            </a:r>
+            <a:r>
+              <a:rPr lang="en-US" dirty="0"/>
+              <a:t>  are handled</a:t>
+            </a:r>
+            <a:r>
+              <a:rPr lang="en-US" baseline="0" dirty="0"/>
+              <a:t> inside the catch block. </a:t>
+            </a:r>
+          </a:p>
+          <a:p>
+            <a:endParaRPr lang="en-US" baseline="0" dirty="0"/>
+          </a:p>
+          <a:p>
+            <a:r>
+              <a:rPr lang="en-US" baseline="0" dirty="0"/>
+              <a:t>No </a:t>
+            </a:r>
+            <a:r>
+              <a:rPr lang="en-US" sz="1200" kern="1200" dirty="0" err="1">
+                <a:solidFill>
+                  <a:schemeClr val="tx1"/>
+                </a:solidFill>
+                <a:effectLst/>
+                <a:latin typeface="+mn-lt"/>
+                <a:ea typeface="+mn-ea"/>
+                <a:cs typeface="+mn-cs"/>
+              </a:rPr>
+              <a:t>HttpResponseException</a:t>
+            </a:r>
+            <a:r>
+              <a:rPr lang="en-US" dirty="0"/>
+              <a:t> can propagate above the </a:t>
+            </a:r>
+            <a:r>
+              <a:rPr lang="en-US" dirty="0" err="1"/>
+              <a:t>ActionInvoker</a:t>
+            </a:r>
+            <a:r>
+              <a:rPr lang="en-US" dirty="0"/>
+              <a:t>!!!</a:t>
+            </a:r>
+          </a:p>
+          <a:p>
+            <a:endParaRPr lang="en-US" dirty="0"/>
+          </a:p>
+          <a:p>
+            <a:r>
+              <a:rPr lang="en-US" dirty="0"/>
+              <a:t>2. See inside the try block that if</a:t>
+            </a:r>
+            <a:r>
+              <a:rPr lang="en-US" baseline="0" dirty="0"/>
+              <a:t> return type is </a:t>
+            </a:r>
+            <a:r>
+              <a:rPr lang="en-US" dirty="0" err="1"/>
+              <a:t>IHttpActionResult</a:t>
+            </a:r>
+            <a:r>
+              <a:rPr lang="en-US" dirty="0"/>
+              <a:t> or object are</a:t>
+            </a:r>
+            <a:r>
+              <a:rPr lang="en-US" baseline="0" dirty="0"/>
+              <a:t> handled in one way. All other return types are handled through a converter.</a:t>
             </a:r>
             <a:endParaRPr lang="en-US" dirty="0"/>
           </a:p>
@@ -1687,6 +1844,68 @@
           <a:bodyPr/>
           <a:lstStyle/>
           <a:p>
+            <a:pPr marL="171450" indent="-171450">
+              <a:buFont typeface="Arial" panose="020B0604020202020204" pitchFamily="34" charset="0"/>
+              <a:buChar char="•"/>
+            </a:pPr>
+            <a:r>
+              <a:rPr lang="en-US" sz="1200" dirty="0" err="1">
+                <a:solidFill>
+                  <a:srgbClr val="4EC9B0"/>
+                </a:solidFill>
+                <a:latin typeface="Consolas" panose="020B0609020204030204" pitchFamily="49" charset="0"/>
+              </a:rPr>
+              <a:t>DelegatingHandler</a:t>
+            </a:r>
+            <a:r>
+              <a:rPr lang="en-US" sz="1200" dirty="0">
+                <a:solidFill>
+                  <a:srgbClr val="4EC9B0"/>
+                </a:solidFill>
+                <a:latin typeface="Consolas" panose="020B0609020204030204" pitchFamily="49" charset="0"/>
+              </a:rPr>
+              <a:t> </a:t>
+            </a:r>
+            <a:r>
+              <a:rPr lang="en-US" dirty="0"/>
+              <a:t>has </a:t>
+            </a:r>
+            <a:r>
+              <a:rPr lang="en-US" sz="1200" dirty="0" err="1">
+                <a:solidFill>
+                  <a:srgbClr val="D4D4D4"/>
+                </a:solidFill>
+                <a:latin typeface="Consolas" panose="020B0609020204030204" pitchFamily="49" charset="0"/>
+              </a:rPr>
+              <a:t>InnerHandler</a:t>
+            </a:r>
+            <a:r>
+              <a:rPr lang="en-US" sz="1200" dirty="0">
+                <a:solidFill>
+                  <a:srgbClr val="D4D4D4"/>
+                </a:solidFill>
+                <a:latin typeface="Consolas" panose="020B0609020204030204" pitchFamily="49" charset="0"/>
+              </a:rPr>
+              <a:t> while </a:t>
+            </a:r>
+            <a:r>
+              <a:rPr lang="en-US" sz="1200" dirty="0" err="1">
+                <a:solidFill>
+                  <a:srgbClr val="4EC9B0"/>
+                </a:solidFill>
+                <a:latin typeface="Consolas" panose="020B0609020204030204" pitchFamily="49" charset="0"/>
+              </a:rPr>
+              <a:t>HttpMessageHandler</a:t>
+            </a:r>
+            <a:r>
+              <a:rPr lang="en-US" sz="1200" dirty="0">
+                <a:solidFill>
+                  <a:srgbClr val="4EC9B0"/>
+                </a:solidFill>
+                <a:latin typeface="Consolas" panose="020B0609020204030204" pitchFamily="49" charset="0"/>
+              </a:rPr>
+              <a:t> does not.</a:t>
+            </a:r>
             <a:endParaRPr lang="en-US" dirty="0"/>
           </a:p>
         </p:txBody>
@@ -1775,10 +1994,6 @@
               <a:buAutoNum type="arabicPeriod"/>
             </a:pPr>
             <a:r>
-              <a:rPr lang="en-US" dirty="0"/>
-              <a:t>3. </a:t>
-            </a:r>
-            <a:r>
               <a:rPr lang="en-US" sz="1200" dirty="0"/>
               <a:t>Use the </a:t>
             </a:r>
@@ -1988,9 +2203,84 @@
               </a:rPr>
               <a:t>.</a:t>
             </a:r>
+          </a:p>
+          <a:p>
             <a:endParaRPr lang="en-US" sz="1200" dirty="0"/>
           </a:p>
           <a:p>
+            <a:r>
+              <a:rPr lang="en-US" dirty="0"/>
+              <a:t>2. There</a:t>
+            </a:r>
+            <a:r>
+              <a:rPr lang="en-US" baseline="0" dirty="0"/>
+              <a:t> are plenty of </a:t>
+            </a:r>
+            <a:r>
+              <a:rPr lang="en-US" baseline="0" dirty="0" err="1"/>
+              <a:t>exctension</a:t>
+            </a:r>
+            <a:r>
+              <a:rPr lang="en-US" baseline="0" dirty="0"/>
+              <a:t> methods for </a:t>
+            </a:r>
+            <a:r>
+              <a:rPr lang="en-US" sz="1200" kern="1200" dirty="0" err="1">
+                <a:solidFill>
+                  <a:schemeClr val="tx1"/>
+                </a:solidFill>
+                <a:effectLst/>
+                <a:latin typeface="+mn-lt"/>
+                <a:ea typeface="+mn-ea"/>
+                <a:cs typeface="+mn-cs"/>
+              </a:rPr>
+              <a:t>HttpRouteCollection</a:t>
+            </a:r>
+            <a:r>
+              <a:rPr lang="en-US" dirty="0"/>
+              <a:t>  which will work</a:t>
+            </a:r>
+            <a:r>
+              <a:rPr lang="en-US" baseline="0" dirty="0"/>
+              <a:t> in most of the time. (</a:t>
+            </a:r>
+            <a:r>
+              <a:rPr lang="en-US" sz="1200" kern="1200" dirty="0" err="1">
+                <a:solidFill>
+                  <a:schemeClr val="tx1"/>
+                </a:solidFill>
+                <a:latin typeface="+mn-lt"/>
+                <a:ea typeface="+mn-ea"/>
+                <a:cs typeface="+mn-cs"/>
+              </a:rPr>
+              <a:t>IgnoreRoute</a:t>
+            </a:r>
+            <a:r>
+              <a:rPr lang="en-US" sz="1200" kern="1200" dirty="0">
+                <a:solidFill>
+                  <a:schemeClr val="tx1"/>
+                </a:solidFill>
+                <a:latin typeface="+mn-lt"/>
+                <a:ea typeface="+mn-ea"/>
+                <a:cs typeface="+mn-cs"/>
+              </a:rPr>
+              <a:t>, </a:t>
+            </a:r>
+            <a:r>
+              <a:rPr lang="en-US" sz="1200" kern="1200" dirty="0" err="1">
+                <a:solidFill>
+                  <a:schemeClr val="tx1"/>
+                </a:solidFill>
+                <a:latin typeface="+mn-lt"/>
+                <a:ea typeface="+mn-ea"/>
+                <a:cs typeface="+mn-cs"/>
+              </a:rPr>
+              <a:t>MapHttpRoute</a:t>
+            </a:r>
+            <a:r>
+              <a:rPr lang="en-US" baseline="0" dirty="0"/>
+              <a:t>).</a:t>
+            </a:r>
             <a:endParaRPr lang="en-US" dirty="0"/>
           </a:p>
         </p:txBody>
@@ -2160,7 +2450,40 @@
             </a:r>
             <a:r>
               <a:rPr lang="en-US" baseline="0" dirty="0"/>
-              <a:t> is a try/catch block around the action invocation.</a:t>
+              <a:t> is a try/catch block in the </a:t>
+            </a:r>
+            <a:r>
+              <a:rPr lang="en-US" sz="1200" kern="1200" dirty="0" err="1">
+                <a:solidFill>
+                  <a:schemeClr val="tx1"/>
+                </a:solidFill>
+                <a:latin typeface="+mn-lt"/>
+                <a:ea typeface="+mn-ea"/>
+                <a:cs typeface="+mn-cs"/>
+              </a:rPr>
+              <a:t>SendAsync</a:t>
+            </a:r>
+            <a:r>
+              <a:rPr lang="en-US" sz="1200" kern="1200" dirty="0">
+                <a:solidFill>
+                  <a:schemeClr val="tx1"/>
+                </a:solidFill>
+                <a:latin typeface="+mn-lt"/>
+                <a:ea typeface="+mn-ea"/>
+                <a:cs typeface="+mn-cs"/>
+              </a:rPr>
+              <a:t> method of the </a:t>
+            </a:r>
+            <a:r>
+              <a:rPr lang="en-US" sz="1200" kern="1200" dirty="0" err="1">
+                <a:solidFill>
+                  <a:schemeClr val="tx1"/>
+                </a:solidFill>
+                <a:latin typeface="+mn-lt"/>
+                <a:ea typeface="+mn-ea"/>
+                <a:cs typeface="+mn-cs"/>
+              </a:rPr>
+              <a:t>HttpControllerDispatcher</a:t>
             </a:r>
             <a:endParaRPr lang="en-US" dirty="0"/>
           </a:p>
@@ -2786,7 +3109,7 @@
           <a:p>
             <a:fld id="{030305CC-77D9-43C1-9487-C134B9231D54}" type="datetimeFigureOut">
               <a:rPr lang="en-US" smtClean="0"/>
-              <a:t>6/12/2017</a:t>
+              <a:t>12-Aug-17</a:t>
             </a:fld>
             <a:endParaRPr lang="en-US"/>
           </a:p>
@@ -2964,7 +3287,7 @@
           <a:p>
             <a:fld id="{030305CC-77D9-43C1-9487-C134B9231D54}" type="datetimeFigureOut">
               <a:rPr lang="en-US" smtClean="0"/>
-              <a:t>6/12/2017</a:t>
+              <a:t>12-Aug-17</a:t>
             </a:fld>
             <a:endParaRPr lang="en-US"/>
           </a:p>
@@ -3132,7 +3455,7 @@
           <a:p>
             <a:fld id="{030305CC-77D9-43C1-9487-C134B9231D54}" type="datetimeFigureOut">
               <a:rPr lang="en-US" smtClean="0"/>
-              <a:t>6/12/2017</a:t>
+              <a:t>12-Aug-17</a:t>
             </a:fld>
             <a:endParaRPr lang="en-US"/>
           </a:p>
@@ -3589,7 +3912,7 @@
           <a:p>
             <a:fld id="{030305CC-77D9-43C1-9487-C134B9231D54}" type="datetimeFigureOut">
               <a:rPr lang="en-US" smtClean="0"/>
-              <a:t>6/12/2017</a:t>
+              <a:t>12-Aug-17</a:t>
             </a:fld>
             <a:endParaRPr lang="en-US"/>
           </a:p>
@@ -3818,7 +4141,7 @@
           <a:p>
             <a:fld id="{030305CC-77D9-43C1-9487-C134B9231D54}" type="datetimeFigureOut">
               <a:rPr lang="en-US" smtClean="0"/>
-              <a:t>6/12/2017</a:t>
+              <a:t>12-Aug-17</a:t>
             </a:fld>
             <a:endParaRPr lang="en-US"/>
           </a:p>
@@ -4182,7 +4505,7 @@
           <a:p>
             <a:fld id="{030305CC-77D9-43C1-9487-C134B9231D54}" type="datetimeFigureOut">
               <a:rPr lang="en-US" smtClean="0"/>
-              <a:t>6/12/2017</a:t>
+              <a:t>12-Aug-17</a:t>
             </a:fld>
             <a:endParaRPr lang="en-US"/>
           </a:p>
@@ -4299,7 +4622,7 @@
           <a:p>
             <a:fld id="{030305CC-77D9-43C1-9487-C134B9231D54}" type="datetimeFigureOut">
               <a:rPr lang="en-US" smtClean="0"/>
-              <a:t>6/12/2017</a:t>
+              <a:t>12-Aug-17</a:t>
             </a:fld>
             <a:endParaRPr lang="en-US"/>
           </a:p>
@@ -4394,7 +4717,7 @@
           <a:p>
             <a:fld id="{030305CC-77D9-43C1-9487-C134B9231D54}" type="datetimeFigureOut">
               <a:rPr lang="en-US" smtClean="0"/>
-              <a:t>6/12/2017</a:t>
+              <a:t>12-Aug-17</a:t>
             </a:fld>
             <a:endParaRPr lang="en-US"/>
           </a:p>
@@ -4669,7 +4992,7 @@
           <a:p>
             <a:fld id="{030305CC-77D9-43C1-9487-C134B9231D54}" type="datetimeFigureOut">
               <a:rPr lang="en-US" smtClean="0"/>
-              <a:t>6/12/2017</a:t>
+              <a:t>12-Aug-17</a:t>
             </a:fld>
             <a:endParaRPr lang="en-US"/>
           </a:p>
@@ -4924,7 +5247,7 @@
           <a:p>
             <a:fld id="{030305CC-77D9-43C1-9487-C134B9231D54}" type="datetimeFigureOut">
               <a:rPr lang="en-US" smtClean="0"/>
-              <a:t>6/12/2017</a:t>
+              <a:t>12-Aug-17</a:t>
             </a:fld>
             <a:endParaRPr lang="en-US"/>
           </a:p>
@@ -5136,7 +5459,7 @@
           <a:p>
             <a:fld id="{030305CC-77D9-43C1-9487-C134B9231D54}" type="datetimeFigureOut">
               <a:rPr lang="en-US" smtClean="0"/>
-              <a:t>6/12/2017</a:t>
+              <a:t>12-Aug-17</a:t>
             </a:fld>
             <a:endParaRPr lang="en-US"/>
           </a:p>
@@ -5559,7 +5882,7 @@
         </p:spPr>
         <p:txBody>
           <a:bodyPr>
-            <a:normAutofit fontScale="90000"/>
+            <a:normAutofit/>
           </a:bodyPr>
           <a:lstStyle/>
           <a:p>
@@ -6136,7 +6459,7 @@
             </a:pPr>
             <a:r>
               <a:rPr lang="en-US" sz="2400" dirty="0"/>
-              <a:t>The binding is executed.</a:t>
+              <a:t>The model binding is executed.</a:t>
             </a:r>
           </a:p>
           <a:p>
@@ -7611,7 +7934,7 @@
         <p:spPr>
           <a:xfrm>
             <a:off x="1455438" y="694159"/>
-            <a:ext cx="10510576" cy="4524315"/>
+            <a:ext cx="10510576" cy="5262979"/>
           </a:xfrm>
           <a:prstGeom prst="rect">
             <a:avLst/>
@@ -7641,7 +7964,7 @@
               <a:rPr lang="en-US" sz="2400" dirty="0">
                 <a:hlinkClick r:id="rId3"/>
               </a:rPr>
-              <a:t>https://github.com/OData/WebApi/blob/v3.2-rtm</a:t>
+              <a:t>https://github.com/aspnet/AspNetWebStack</a:t>
             </a:r>
             <a:endParaRPr lang="en-US" sz="2400" b="1" dirty="0"/>
           </a:p>
@@ -7678,6 +8001,18 @@
                 <a:hlinkClick r:id="rId6"/>
               </a:rPr>
               <a:t>http://chimera.labs.oreilly.com/books/1234000001708/ch12.html#_apicontroller_processing_model</a:t>
+            </a:r>
+            <a:endParaRPr lang="en-US" sz="2400" dirty="0"/>
+          </a:p>
+          <a:p>
+            <a:pPr marL="514350" indent="-514350">
+              <a:buAutoNum type="arabicPeriod"/>
+            </a:pPr>
+            <a:r>
+              <a:rPr lang="en-US" sz="2400" dirty="0">
+                <a:hlinkClick r:id="rId7"/>
+              </a:rPr>
+              <a:t>https://docs.microsoft.com/en-us/aspnet/web-api/overview/error-handling/exception-handling</a:t>
             </a:r>
             <a:endParaRPr lang="en-US" sz="2400" dirty="0"/>
           </a:p>
@@ -9835,7 +10170,7 @@
         <p:spPr>
           <a:xfrm>
             <a:off x="1455438" y="694159"/>
-            <a:ext cx="10510576" cy="4585871"/>
+            <a:ext cx="10510576" cy="4955203"/>
           </a:xfrm>
           <a:prstGeom prst="rect">
             <a:avLst/>
@@ -9930,7 +10265,15 @@
             </a:pPr>
             <a:r>
               <a:rPr lang="en-US" sz="2400" dirty="0"/>
-              <a:t>Use the </a:t>
+              <a:t>When creating a new </a:t>
+            </a:r>
+            <a:r>
+              <a:rPr lang="en-US" sz="2400" dirty="0" err="1"/>
+              <a:t>IHttpRoute</a:t>
+            </a:r>
+            <a:r>
+              <a:rPr lang="en-US" sz="2400" dirty="0"/>
+              <a:t> use the </a:t>
             </a:r>
             <a:r>
               <a:rPr lang="en-US" sz="2400" dirty="0" err="1"/>
@@ -9938,7 +10281,7 @@
             </a:r>
             <a:r>
               <a:rPr lang="en-US" sz="2400" dirty="0"/>
-              <a:t> extension method if possible.</a:t>
+              <a:t>( … ) extension method if possible.</a:t>
             </a:r>
           </a:p>
           <a:p>

</xml_diff>